<commit_message>
add ijcai 2021 workshop website
</commit_message>
<xml_diff>
--- a/workshop_organizers.pptx
+++ b/workshop_organizers.pptx
@@ -8,6 +8,7 @@
     <p:sldId id="256" r:id="rId2"/>
     <p:sldId id="260" r:id="rId3"/>
     <p:sldId id="261" r:id="rId4"/>
+    <p:sldId id="262" r:id="rId5"/>
   </p:sldIdLst>
   <p:sldSz cx="12701588" cy="6858000"/>
   <p:notesSz cx="6858000" cy="9144000"/>
@@ -245,7 +246,7 @@
           <a:p>
             <a:fld id="{7BEDB911-9409-4C46-A401-C957B4E1E83C}" type="datetimeFigureOut">
               <a:rPr kumimoji="1" lang="zh-CN" altLang="en-US" smtClean="0"/>
-              <a:t>2020/10/3</a:t>
+              <a:t>2021/3/24</a:t>
             </a:fld>
             <a:endParaRPr kumimoji="1" lang="zh-CN" altLang="en-US"/>
           </a:p>
@@ -415,7 +416,7 @@
           <a:p>
             <a:fld id="{7BEDB911-9409-4C46-A401-C957B4E1E83C}" type="datetimeFigureOut">
               <a:rPr kumimoji="1" lang="zh-CN" altLang="en-US" smtClean="0"/>
-              <a:t>2020/10/3</a:t>
+              <a:t>2021/3/24</a:t>
             </a:fld>
             <a:endParaRPr kumimoji="1" lang="zh-CN" altLang="en-US"/>
           </a:p>
@@ -595,7 +596,7 @@
           <a:p>
             <a:fld id="{7BEDB911-9409-4C46-A401-C957B4E1E83C}" type="datetimeFigureOut">
               <a:rPr kumimoji="1" lang="zh-CN" altLang="en-US" smtClean="0"/>
-              <a:t>2020/10/3</a:t>
+              <a:t>2021/3/24</a:t>
             </a:fld>
             <a:endParaRPr kumimoji="1" lang="zh-CN" altLang="en-US"/>
           </a:p>
@@ -765,7 +766,7 @@
           <a:p>
             <a:fld id="{7BEDB911-9409-4C46-A401-C957B4E1E83C}" type="datetimeFigureOut">
               <a:rPr kumimoji="1" lang="zh-CN" altLang="en-US" smtClean="0"/>
-              <a:t>2020/10/3</a:t>
+              <a:t>2021/3/24</a:t>
             </a:fld>
             <a:endParaRPr kumimoji="1" lang="zh-CN" altLang="en-US"/>
           </a:p>
@@ -1011,7 +1012,7 @@
           <a:p>
             <a:fld id="{7BEDB911-9409-4C46-A401-C957B4E1E83C}" type="datetimeFigureOut">
               <a:rPr kumimoji="1" lang="zh-CN" altLang="en-US" smtClean="0"/>
-              <a:t>2020/10/3</a:t>
+              <a:t>2021/3/24</a:t>
             </a:fld>
             <a:endParaRPr kumimoji="1" lang="zh-CN" altLang="en-US"/>
           </a:p>
@@ -1243,7 +1244,7 @@
           <a:p>
             <a:fld id="{7BEDB911-9409-4C46-A401-C957B4E1E83C}" type="datetimeFigureOut">
               <a:rPr kumimoji="1" lang="zh-CN" altLang="en-US" smtClean="0"/>
-              <a:t>2020/10/3</a:t>
+              <a:t>2021/3/24</a:t>
             </a:fld>
             <a:endParaRPr kumimoji="1" lang="zh-CN" altLang="en-US"/>
           </a:p>
@@ -1610,7 +1611,7 @@
           <a:p>
             <a:fld id="{7BEDB911-9409-4C46-A401-C957B4E1E83C}" type="datetimeFigureOut">
               <a:rPr kumimoji="1" lang="zh-CN" altLang="en-US" smtClean="0"/>
-              <a:t>2020/10/3</a:t>
+              <a:t>2021/3/24</a:t>
             </a:fld>
             <a:endParaRPr kumimoji="1" lang="zh-CN" altLang="en-US"/>
           </a:p>
@@ -1728,7 +1729,7 @@
           <a:p>
             <a:fld id="{7BEDB911-9409-4C46-A401-C957B4E1E83C}" type="datetimeFigureOut">
               <a:rPr kumimoji="1" lang="zh-CN" altLang="en-US" smtClean="0"/>
-              <a:t>2020/10/3</a:t>
+              <a:t>2021/3/24</a:t>
             </a:fld>
             <a:endParaRPr kumimoji="1" lang="zh-CN" altLang="en-US"/>
           </a:p>
@@ -1823,7 +1824,7 @@
           <a:p>
             <a:fld id="{7BEDB911-9409-4C46-A401-C957B4E1E83C}" type="datetimeFigureOut">
               <a:rPr kumimoji="1" lang="zh-CN" altLang="en-US" smtClean="0"/>
-              <a:t>2020/10/3</a:t>
+              <a:t>2021/3/24</a:t>
             </a:fld>
             <a:endParaRPr kumimoji="1" lang="zh-CN" altLang="en-US"/>
           </a:p>
@@ -2100,7 +2101,7 @@
           <a:p>
             <a:fld id="{7BEDB911-9409-4C46-A401-C957B4E1E83C}" type="datetimeFigureOut">
               <a:rPr kumimoji="1" lang="zh-CN" altLang="en-US" smtClean="0"/>
-              <a:t>2020/10/3</a:t>
+              <a:t>2021/3/24</a:t>
             </a:fld>
             <a:endParaRPr kumimoji="1" lang="zh-CN" altLang="en-US"/>
           </a:p>
@@ -2357,7 +2358,7 @@
           <a:p>
             <a:fld id="{7BEDB911-9409-4C46-A401-C957B4E1E83C}" type="datetimeFigureOut">
               <a:rPr kumimoji="1" lang="zh-CN" altLang="en-US" smtClean="0"/>
-              <a:t>2020/10/3</a:t>
+              <a:t>2021/3/24</a:t>
             </a:fld>
             <a:endParaRPr kumimoji="1" lang="zh-CN" altLang="en-US"/>
           </a:p>
@@ -2570,7 +2571,7 @@
           <a:p>
             <a:fld id="{7BEDB911-9409-4C46-A401-C957B4E1E83C}" type="datetimeFigureOut">
               <a:rPr kumimoji="1" lang="zh-CN" altLang="en-US" smtClean="0"/>
-              <a:t>2020/10/3</a:t>
+              <a:t>2021/3/24</a:t>
             </a:fld>
             <a:endParaRPr kumimoji="1" lang="zh-CN" altLang="en-US"/>
           </a:p>
@@ -4270,6 +4271,439 @@
 </p:sld>
 </file>
 
+<file path=ppt/slides/slide4.xml><?xml version="1.0" encoding="utf-8"?>
+<p:sld xmlns:a="http://schemas.openxmlformats.org/drawingml/2006/main" xmlns:r="http://schemas.openxmlformats.org/officeDocument/2006/relationships" xmlns:p="http://schemas.openxmlformats.org/presentationml/2006/main">
+  <p:cSld>
+    <p:spTree>
+      <p:nvGrpSpPr>
+        <p:cNvPr id="1" name=""/>
+        <p:cNvGrpSpPr/>
+        <p:nvPr/>
+      </p:nvGrpSpPr>
+      <p:grpSpPr>
+        <a:xfrm>
+          <a:off x="0" y="0"/>
+          <a:ext cx="0" cy="0"/>
+          <a:chOff x="0" y="0"/>
+          <a:chExt cx="0" cy="0"/>
+        </a:xfrm>
+      </p:grpSpPr>
+      <p:pic>
+        <p:nvPicPr>
+          <p:cNvPr id="5" name="图片 4">
+            <a:extLst>
+              <a:ext uri="{FF2B5EF4-FFF2-40B4-BE49-F238E27FC236}">
+                <a16:creationId xmlns:a16="http://schemas.microsoft.com/office/drawing/2014/main" id="{71CE1FB0-3E52-3B41-A20E-582ED4239BA4}"/>
+              </a:ext>
+            </a:extLst>
+          </p:cNvPr>
+          <p:cNvPicPr>
+            <a:picLocks noChangeAspect="1"/>
+          </p:cNvPicPr>
+          <p:nvPr/>
+        </p:nvPicPr>
+        <p:blipFill>
+          <a:blip r:embed="rId2"/>
+          <a:stretch>
+            <a:fillRect/>
+          </a:stretch>
+        </p:blipFill>
+        <p:spPr>
+          <a:xfrm>
+            <a:off x="173425" y="32758"/>
+            <a:ext cx="2367298" cy="2376000"/>
+          </a:xfrm>
+          <a:prstGeom prst="rect">
+            <a:avLst/>
+          </a:prstGeom>
+        </p:spPr>
+      </p:pic>
+      <p:sp>
+        <p:nvSpPr>
+          <p:cNvPr id="13" name="文本框 12">
+            <a:extLst>
+              <a:ext uri="{FF2B5EF4-FFF2-40B4-BE49-F238E27FC236}">
+                <a16:creationId xmlns:a16="http://schemas.microsoft.com/office/drawing/2014/main" id="{2EDEF002-7D77-2E4D-A58E-FF7F18D05B09}"/>
+              </a:ext>
+            </a:extLst>
+          </p:cNvPr>
+          <p:cNvSpPr txBox="1"/>
+          <p:nvPr/>
+        </p:nvSpPr>
+        <p:spPr>
+          <a:xfrm>
+            <a:off x="779688" y="2621973"/>
+            <a:ext cx="1154772" cy="954107"/>
+          </a:xfrm>
+          <a:prstGeom prst="rect">
+            <a:avLst/>
+          </a:prstGeom>
+          <a:noFill/>
+        </p:spPr>
+        <p:txBody>
+          <a:bodyPr wrap="square" rtlCol="0">
+            <a:spAutoFit/>
+          </a:bodyPr>
+          <a:lstStyle/>
+          <a:p>
+            <a:pPr algn="ctr"/>
+            <a:r>
+              <a:rPr kumimoji="1" lang="en-US" altLang="zh-CN" sz="2800" dirty="0" err="1">
+                <a:latin typeface="+mj-lt"/>
+              </a:rPr>
+              <a:t>Zitao</a:t>
+            </a:r>
+            <a:endParaRPr kumimoji="1" lang="en-US" altLang="zh-CN" sz="2800" dirty="0">
+              <a:latin typeface="+mj-lt"/>
+            </a:endParaRPr>
+          </a:p>
+          <a:p>
+            <a:pPr algn="ctr"/>
+            <a:r>
+              <a:rPr kumimoji="1" lang="en-US" altLang="zh-CN" sz="2800" dirty="0">
+                <a:latin typeface="+mj-lt"/>
+              </a:rPr>
+              <a:t>Liu</a:t>
+            </a:r>
+            <a:endParaRPr kumimoji="1" lang="zh-CN" altLang="en-US" sz="2800" dirty="0">
+              <a:latin typeface="+mj-lt"/>
+            </a:endParaRPr>
+          </a:p>
+        </p:txBody>
+      </p:sp>
+      <p:sp>
+        <p:nvSpPr>
+          <p:cNvPr id="15" name="文本框 14">
+            <a:extLst>
+              <a:ext uri="{FF2B5EF4-FFF2-40B4-BE49-F238E27FC236}">
+                <a16:creationId xmlns:a16="http://schemas.microsoft.com/office/drawing/2014/main" id="{ADE6C7B8-09CD-4248-BFF2-1782D4F0637E}"/>
+              </a:ext>
+            </a:extLst>
+          </p:cNvPr>
+          <p:cNvSpPr txBox="1"/>
+          <p:nvPr/>
+        </p:nvSpPr>
+        <p:spPr>
+          <a:xfrm>
+            <a:off x="3126108" y="2621973"/>
+            <a:ext cx="1453185" cy="954107"/>
+          </a:xfrm>
+          <a:prstGeom prst="rect">
+            <a:avLst/>
+          </a:prstGeom>
+          <a:noFill/>
+        </p:spPr>
+        <p:txBody>
+          <a:bodyPr wrap="square" rtlCol="0">
+            <a:spAutoFit/>
+          </a:bodyPr>
+          <a:lstStyle/>
+          <a:p>
+            <a:pPr algn="ctr"/>
+            <a:r>
+              <a:rPr kumimoji="1" lang="en-US" altLang="zh-CN" sz="2800" dirty="0">
+                <a:latin typeface="+mj-lt"/>
+              </a:rPr>
+              <a:t>Richard</a:t>
+            </a:r>
+          </a:p>
+          <a:p>
+            <a:pPr algn="ctr"/>
+            <a:r>
+              <a:rPr kumimoji="1" lang="en-US" altLang="zh-CN" sz="2800" dirty="0">
+                <a:latin typeface="+mj-lt"/>
+              </a:rPr>
+              <a:t>Tong</a:t>
+            </a:r>
+            <a:endParaRPr kumimoji="1" lang="zh-CN" altLang="en-US" sz="2800" dirty="0">
+              <a:latin typeface="+mj-lt"/>
+            </a:endParaRPr>
+          </a:p>
+        </p:txBody>
+      </p:sp>
+      <p:sp>
+        <p:nvSpPr>
+          <p:cNvPr id="17" name="文本框 16">
+            <a:extLst>
+              <a:ext uri="{FF2B5EF4-FFF2-40B4-BE49-F238E27FC236}">
+                <a16:creationId xmlns:a16="http://schemas.microsoft.com/office/drawing/2014/main" id="{9E891CE8-5B95-A04B-B400-6A188D26BD2D}"/>
+              </a:ext>
+            </a:extLst>
+          </p:cNvPr>
+          <p:cNvSpPr txBox="1"/>
+          <p:nvPr/>
+        </p:nvSpPr>
+        <p:spPr>
+          <a:xfrm>
+            <a:off x="5624202" y="2621973"/>
+            <a:ext cx="1453184" cy="954107"/>
+          </a:xfrm>
+          <a:prstGeom prst="rect">
+            <a:avLst/>
+          </a:prstGeom>
+          <a:noFill/>
+        </p:spPr>
+        <p:txBody>
+          <a:bodyPr wrap="square" rtlCol="0">
+            <a:spAutoFit/>
+          </a:bodyPr>
+          <a:lstStyle/>
+          <a:p>
+            <a:pPr algn="ctr"/>
+            <a:r>
+              <a:rPr kumimoji="1" lang="en-US" altLang="zh-CN" sz="2800" dirty="0" err="1">
+                <a:latin typeface="+mj-lt"/>
+              </a:rPr>
+              <a:t>Jiliang</a:t>
+            </a:r>
+            <a:endParaRPr kumimoji="1" lang="en-US" altLang="zh-CN" sz="2800" dirty="0">
+              <a:latin typeface="+mj-lt"/>
+            </a:endParaRPr>
+          </a:p>
+          <a:p>
+            <a:pPr algn="ctr"/>
+            <a:r>
+              <a:rPr kumimoji="1" lang="en-US" altLang="zh-CN" sz="2800" dirty="0">
+                <a:latin typeface="+mj-lt"/>
+              </a:rPr>
+              <a:t>Tang</a:t>
+            </a:r>
+          </a:p>
+        </p:txBody>
+      </p:sp>
+      <p:sp>
+        <p:nvSpPr>
+          <p:cNvPr id="18" name="文本框 17">
+            <a:extLst>
+              <a:ext uri="{FF2B5EF4-FFF2-40B4-BE49-F238E27FC236}">
+                <a16:creationId xmlns:a16="http://schemas.microsoft.com/office/drawing/2014/main" id="{91B1C136-6F6D-3249-8311-CBA0596EECA9}"/>
+              </a:ext>
+            </a:extLst>
+          </p:cNvPr>
+          <p:cNvSpPr txBox="1"/>
+          <p:nvPr/>
+        </p:nvSpPr>
+        <p:spPr>
+          <a:xfrm>
+            <a:off x="7999494" y="2621972"/>
+            <a:ext cx="1706326" cy="954107"/>
+          </a:xfrm>
+          <a:prstGeom prst="rect">
+            <a:avLst/>
+          </a:prstGeom>
+          <a:noFill/>
+        </p:spPr>
+        <p:txBody>
+          <a:bodyPr wrap="square" rtlCol="0">
+            <a:spAutoFit/>
+          </a:bodyPr>
+          <a:lstStyle/>
+          <a:p>
+            <a:pPr algn="ctr"/>
+            <a:r>
+              <a:rPr kumimoji="1" lang="en-US" altLang="zh-CN" sz="2800" dirty="0" err="1">
+                <a:latin typeface="+mj-lt"/>
+              </a:rPr>
+              <a:t>Xiangen</a:t>
+            </a:r>
+            <a:endParaRPr kumimoji="1" lang="en-US" altLang="zh-CN" sz="2800" dirty="0">
+              <a:latin typeface="+mj-lt"/>
+            </a:endParaRPr>
+          </a:p>
+          <a:p>
+            <a:pPr algn="ctr"/>
+            <a:r>
+              <a:rPr kumimoji="1" lang="en-US" altLang="zh-CN" sz="2800" dirty="0">
+                <a:latin typeface="+mj-lt"/>
+              </a:rPr>
+              <a:t>Hu</a:t>
+            </a:r>
+            <a:endParaRPr kumimoji="1" lang="zh-CN" altLang="en-US" sz="2800" dirty="0">
+              <a:latin typeface="+mj-lt"/>
+            </a:endParaRPr>
+          </a:p>
+        </p:txBody>
+      </p:sp>
+      <p:sp>
+        <p:nvSpPr>
+          <p:cNvPr id="19" name="文本框 18">
+            <a:extLst>
+              <a:ext uri="{FF2B5EF4-FFF2-40B4-BE49-F238E27FC236}">
+                <a16:creationId xmlns:a16="http://schemas.microsoft.com/office/drawing/2014/main" id="{37302D52-BD15-724F-A0B1-3CAA102352D9}"/>
+              </a:ext>
+            </a:extLst>
+          </p:cNvPr>
+          <p:cNvSpPr txBox="1"/>
+          <p:nvPr/>
+        </p:nvSpPr>
+        <p:spPr>
+          <a:xfrm>
+            <a:off x="10626043" y="2621971"/>
+            <a:ext cx="1453183" cy="954107"/>
+          </a:xfrm>
+          <a:prstGeom prst="rect">
+            <a:avLst/>
+          </a:prstGeom>
+          <a:noFill/>
+        </p:spPr>
+        <p:txBody>
+          <a:bodyPr wrap="square" rtlCol="0">
+            <a:spAutoFit/>
+          </a:bodyPr>
+          <a:lstStyle/>
+          <a:p>
+            <a:pPr algn="ctr"/>
+            <a:r>
+              <a:rPr kumimoji="1" lang="en-US" altLang="zh-CN" sz="2800" dirty="0">
+                <a:latin typeface="+mj-lt"/>
+              </a:rPr>
+              <a:t>Hang</a:t>
+            </a:r>
+          </a:p>
+          <a:p>
+            <a:pPr algn="ctr"/>
+            <a:r>
+              <a:rPr kumimoji="1" lang="en-US" altLang="zh-CN" sz="2800" dirty="0">
+                <a:latin typeface="+mj-lt"/>
+              </a:rPr>
+              <a:t>Li</a:t>
+            </a:r>
+            <a:endParaRPr kumimoji="1" lang="zh-CN" altLang="en-US" sz="2800" dirty="0">
+              <a:latin typeface="+mj-lt"/>
+            </a:endParaRPr>
+          </a:p>
+        </p:txBody>
+      </p:sp>
+      <p:pic>
+        <p:nvPicPr>
+          <p:cNvPr id="16" name="图片 15">
+            <a:extLst>
+              <a:ext uri="{FF2B5EF4-FFF2-40B4-BE49-F238E27FC236}">
+                <a16:creationId xmlns:a16="http://schemas.microsoft.com/office/drawing/2014/main" id="{3F1F2D72-242C-8846-81DD-850F9414AE92}"/>
+              </a:ext>
+            </a:extLst>
+          </p:cNvPr>
+          <p:cNvPicPr>
+            <a:picLocks noChangeAspect="1"/>
+          </p:cNvPicPr>
+          <p:nvPr/>
+        </p:nvPicPr>
+        <p:blipFill rotWithShape="1">
+          <a:blip r:embed="rId3"/>
+          <a:srcRect/>
+          <a:stretch/>
+        </p:blipFill>
+        <p:spPr>
+          <a:xfrm>
+            <a:off x="10164635" y="35293"/>
+            <a:ext cx="2377572" cy="2370930"/>
+          </a:xfrm>
+          <a:prstGeom prst="ellipse">
+            <a:avLst/>
+          </a:prstGeom>
+        </p:spPr>
+      </p:pic>
+      <p:pic>
+        <p:nvPicPr>
+          <p:cNvPr id="20" name="图片 19">
+            <a:extLst>
+              <a:ext uri="{FF2B5EF4-FFF2-40B4-BE49-F238E27FC236}">
+                <a16:creationId xmlns:a16="http://schemas.microsoft.com/office/drawing/2014/main" id="{CE2DC4C0-2C91-5A4E-AF3B-672A2438C188}"/>
+              </a:ext>
+            </a:extLst>
+          </p:cNvPr>
+          <p:cNvPicPr>
+            <a:picLocks noChangeAspect="1"/>
+          </p:cNvPicPr>
+          <p:nvPr/>
+        </p:nvPicPr>
+        <p:blipFill>
+          <a:blip r:embed="rId4"/>
+          <a:stretch>
+            <a:fillRect/>
+          </a:stretch>
+        </p:blipFill>
+        <p:spPr>
+          <a:xfrm>
+            <a:off x="7664657" y="32758"/>
+            <a:ext cx="2376000" cy="2376000"/>
+          </a:xfrm>
+          <a:prstGeom prst="ellipse">
+            <a:avLst/>
+          </a:prstGeom>
+        </p:spPr>
+      </p:pic>
+      <p:pic>
+        <p:nvPicPr>
+          <p:cNvPr id="21" name="图片 20">
+            <a:extLst>
+              <a:ext uri="{FF2B5EF4-FFF2-40B4-BE49-F238E27FC236}">
+                <a16:creationId xmlns:a16="http://schemas.microsoft.com/office/drawing/2014/main" id="{88CCE240-FCB0-9140-8C88-A2AD5CDDBB14}"/>
+              </a:ext>
+            </a:extLst>
+          </p:cNvPr>
+          <p:cNvPicPr>
+            <a:picLocks noChangeAspect="1"/>
+          </p:cNvPicPr>
+          <p:nvPr/>
+        </p:nvPicPr>
+        <p:blipFill rotWithShape="1">
+          <a:blip r:embed="rId5"/>
+          <a:srcRect/>
+          <a:stretch/>
+        </p:blipFill>
+        <p:spPr>
+          <a:xfrm>
+            <a:off x="2678025" y="32758"/>
+            <a:ext cx="2341812" cy="2376000"/>
+          </a:xfrm>
+          <a:prstGeom prst="ellipse">
+            <a:avLst/>
+          </a:prstGeom>
+        </p:spPr>
+      </p:pic>
+      <p:pic>
+        <p:nvPicPr>
+          <p:cNvPr id="23" name="图片 22">
+            <a:extLst>
+              <a:ext uri="{FF2B5EF4-FFF2-40B4-BE49-F238E27FC236}">
+                <a16:creationId xmlns:a16="http://schemas.microsoft.com/office/drawing/2014/main" id="{9ED207F5-99DD-B141-9EC1-0F053AD6433E}"/>
+              </a:ext>
+            </a:extLst>
+          </p:cNvPr>
+          <p:cNvPicPr>
+            <a:picLocks noChangeAspect="1"/>
+          </p:cNvPicPr>
+          <p:nvPr/>
+        </p:nvPicPr>
+        <p:blipFill rotWithShape="1">
+          <a:blip r:embed="rId6"/>
+          <a:srcRect l="831" t="5424" r="-831" b="28140"/>
+          <a:stretch/>
+        </p:blipFill>
+        <p:spPr>
+          <a:xfrm>
+            <a:off x="5157139" y="32758"/>
+            <a:ext cx="2376000" cy="2376000"/>
+          </a:xfrm>
+          <a:prstGeom prst="ellipse">
+            <a:avLst/>
+          </a:prstGeom>
+        </p:spPr>
+      </p:pic>
+    </p:spTree>
+    <p:extLst>
+      <p:ext uri="{BB962C8B-B14F-4D97-AF65-F5344CB8AC3E}">
+        <p14:creationId xmlns:p14="http://schemas.microsoft.com/office/powerpoint/2010/main" val="2900619044"/>
+      </p:ext>
+    </p:extLst>
+  </p:cSld>
+  <p:clrMapOvr>
+    <a:masterClrMapping/>
+  </p:clrMapOvr>
+</p:sld>
+</file>
+
 <file path=ppt/theme/theme1.xml><?xml version="1.0" encoding="utf-8"?>
 <a:theme xmlns:a="http://schemas.openxmlformats.org/drawingml/2006/main" name="Office 主题​​">
   <a:themeElements>

</xml_diff>

<commit_message>
resize images and set up aaai2023
</commit_message>
<xml_diff>
--- a/workshop_organizers.pptx
+++ b/workshop_organizers.pptx
@@ -10,6 +10,7 @@
     <p:sldId id="261" r:id="rId4"/>
     <p:sldId id="262" r:id="rId5"/>
     <p:sldId id="263" r:id="rId6"/>
+    <p:sldId id="265" r:id="rId7"/>
   </p:sldIdLst>
   <p:sldSz cx="12701588" cy="6858000"/>
   <p:notesSz cx="6858000" cy="9144000"/>
@@ -247,7 +248,7 @@
           <a:p>
             <a:fld id="{7BEDB911-9409-4C46-A401-C957B4E1E83C}" type="datetimeFigureOut">
               <a:rPr kumimoji="1" lang="zh-CN" altLang="en-US" smtClean="0"/>
-              <a:t>2021/9/5</a:t>
+              <a:t>2022/9/16</a:t>
             </a:fld>
             <a:endParaRPr kumimoji="1" lang="zh-CN" altLang="en-US"/>
           </a:p>
@@ -417,7 +418,7 @@
           <a:p>
             <a:fld id="{7BEDB911-9409-4C46-A401-C957B4E1E83C}" type="datetimeFigureOut">
               <a:rPr kumimoji="1" lang="zh-CN" altLang="en-US" smtClean="0"/>
-              <a:t>2021/9/5</a:t>
+              <a:t>2022/9/16</a:t>
             </a:fld>
             <a:endParaRPr kumimoji="1" lang="zh-CN" altLang="en-US"/>
           </a:p>
@@ -597,7 +598,7 @@
           <a:p>
             <a:fld id="{7BEDB911-9409-4C46-A401-C957B4E1E83C}" type="datetimeFigureOut">
               <a:rPr kumimoji="1" lang="zh-CN" altLang="en-US" smtClean="0"/>
-              <a:t>2021/9/5</a:t>
+              <a:t>2022/9/16</a:t>
             </a:fld>
             <a:endParaRPr kumimoji="1" lang="zh-CN" altLang="en-US"/>
           </a:p>
@@ -767,7 +768,7 @@
           <a:p>
             <a:fld id="{7BEDB911-9409-4C46-A401-C957B4E1E83C}" type="datetimeFigureOut">
               <a:rPr kumimoji="1" lang="zh-CN" altLang="en-US" smtClean="0"/>
-              <a:t>2021/9/5</a:t>
+              <a:t>2022/9/16</a:t>
             </a:fld>
             <a:endParaRPr kumimoji="1" lang="zh-CN" altLang="en-US"/>
           </a:p>
@@ -1013,7 +1014,7 @@
           <a:p>
             <a:fld id="{7BEDB911-9409-4C46-A401-C957B4E1E83C}" type="datetimeFigureOut">
               <a:rPr kumimoji="1" lang="zh-CN" altLang="en-US" smtClean="0"/>
-              <a:t>2021/9/5</a:t>
+              <a:t>2022/9/16</a:t>
             </a:fld>
             <a:endParaRPr kumimoji="1" lang="zh-CN" altLang="en-US"/>
           </a:p>
@@ -1245,7 +1246,7 @@
           <a:p>
             <a:fld id="{7BEDB911-9409-4C46-A401-C957B4E1E83C}" type="datetimeFigureOut">
               <a:rPr kumimoji="1" lang="zh-CN" altLang="en-US" smtClean="0"/>
-              <a:t>2021/9/5</a:t>
+              <a:t>2022/9/16</a:t>
             </a:fld>
             <a:endParaRPr kumimoji="1" lang="zh-CN" altLang="en-US"/>
           </a:p>
@@ -1612,7 +1613,7 @@
           <a:p>
             <a:fld id="{7BEDB911-9409-4C46-A401-C957B4E1E83C}" type="datetimeFigureOut">
               <a:rPr kumimoji="1" lang="zh-CN" altLang="en-US" smtClean="0"/>
-              <a:t>2021/9/5</a:t>
+              <a:t>2022/9/16</a:t>
             </a:fld>
             <a:endParaRPr kumimoji="1" lang="zh-CN" altLang="en-US"/>
           </a:p>
@@ -1730,7 +1731,7 @@
           <a:p>
             <a:fld id="{7BEDB911-9409-4C46-A401-C957B4E1E83C}" type="datetimeFigureOut">
               <a:rPr kumimoji="1" lang="zh-CN" altLang="en-US" smtClean="0"/>
-              <a:t>2021/9/5</a:t>
+              <a:t>2022/9/16</a:t>
             </a:fld>
             <a:endParaRPr kumimoji="1" lang="zh-CN" altLang="en-US"/>
           </a:p>
@@ -1825,7 +1826,7 @@
           <a:p>
             <a:fld id="{7BEDB911-9409-4C46-A401-C957B4E1E83C}" type="datetimeFigureOut">
               <a:rPr kumimoji="1" lang="zh-CN" altLang="en-US" smtClean="0"/>
-              <a:t>2021/9/5</a:t>
+              <a:t>2022/9/16</a:t>
             </a:fld>
             <a:endParaRPr kumimoji="1" lang="zh-CN" altLang="en-US"/>
           </a:p>
@@ -2102,7 +2103,7 @@
           <a:p>
             <a:fld id="{7BEDB911-9409-4C46-A401-C957B4E1E83C}" type="datetimeFigureOut">
               <a:rPr kumimoji="1" lang="zh-CN" altLang="en-US" smtClean="0"/>
-              <a:t>2021/9/5</a:t>
+              <a:t>2022/9/16</a:t>
             </a:fld>
             <a:endParaRPr kumimoji="1" lang="zh-CN" altLang="en-US"/>
           </a:p>
@@ -2359,7 +2360,7 @@
           <a:p>
             <a:fld id="{7BEDB911-9409-4C46-A401-C957B4E1E83C}" type="datetimeFigureOut">
               <a:rPr kumimoji="1" lang="zh-CN" altLang="en-US" smtClean="0"/>
-              <a:t>2021/9/5</a:t>
+              <a:t>2022/9/16</a:t>
             </a:fld>
             <a:endParaRPr kumimoji="1" lang="zh-CN" altLang="en-US"/>
           </a:p>
@@ -2572,7 +2573,7 @@
           <a:p>
             <a:fld id="{7BEDB911-9409-4C46-A401-C957B4E1E83C}" type="datetimeFigureOut">
               <a:rPr kumimoji="1" lang="zh-CN" altLang="en-US" smtClean="0"/>
-              <a:t>2021/9/5</a:t>
+              <a:t>2022/9/16</a:t>
             </a:fld>
             <a:endParaRPr kumimoji="1" lang="zh-CN" altLang="en-US"/>
           </a:p>
@@ -5058,6 +5059,439 @@
 </p:sld>
 </file>
 
+<file path=ppt/slides/slide6.xml><?xml version="1.0" encoding="utf-8"?>
+<p:sld xmlns:a="http://schemas.openxmlformats.org/drawingml/2006/main" xmlns:r="http://schemas.openxmlformats.org/officeDocument/2006/relationships" xmlns:p="http://schemas.openxmlformats.org/presentationml/2006/main">
+  <p:cSld>
+    <p:spTree>
+      <p:nvGrpSpPr>
+        <p:cNvPr id="1" name=""/>
+        <p:cNvGrpSpPr/>
+        <p:nvPr/>
+      </p:nvGrpSpPr>
+      <p:grpSpPr>
+        <a:xfrm>
+          <a:off x="0" y="0"/>
+          <a:ext cx="0" cy="0"/>
+          <a:chOff x="0" y="0"/>
+          <a:chExt cx="0" cy="0"/>
+        </a:xfrm>
+      </p:grpSpPr>
+      <p:pic>
+        <p:nvPicPr>
+          <p:cNvPr id="5" name="图片 4">
+            <a:extLst>
+              <a:ext uri="{FF2B5EF4-FFF2-40B4-BE49-F238E27FC236}">
+                <a16:creationId xmlns:a16="http://schemas.microsoft.com/office/drawing/2014/main" id="{71CE1FB0-3E52-3B41-A20E-582ED4239BA4}"/>
+              </a:ext>
+            </a:extLst>
+          </p:cNvPr>
+          <p:cNvPicPr>
+            <a:picLocks noChangeAspect="1"/>
+          </p:cNvPicPr>
+          <p:nvPr/>
+        </p:nvPicPr>
+        <p:blipFill>
+          <a:blip r:embed="rId2"/>
+          <a:stretch>
+            <a:fillRect/>
+          </a:stretch>
+        </p:blipFill>
+        <p:spPr>
+          <a:xfrm>
+            <a:off x="173425" y="32758"/>
+            <a:ext cx="2367298" cy="2376000"/>
+          </a:xfrm>
+          <a:prstGeom prst="rect">
+            <a:avLst/>
+          </a:prstGeom>
+        </p:spPr>
+      </p:pic>
+      <p:sp>
+        <p:nvSpPr>
+          <p:cNvPr id="13" name="文本框 12">
+            <a:extLst>
+              <a:ext uri="{FF2B5EF4-FFF2-40B4-BE49-F238E27FC236}">
+                <a16:creationId xmlns:a16="http://schemas.microsoft.com/office/drawing/2014/main" id="{2EDEF002-7D77-2E4D-A58E-FF7F18D05B09}"/>
+              </a:ext>
+            </a:extLst>
+          </p:cNvPr>
+          <p:cNvSpPr txBox="1"/>
+          <p:nvPr/>
+        </p:nvSpPr>
+        <p:spPr>
+          <a:xfrm>
+            <a:off x="779688" y="2621973"/>
+            <a:ext cx="1154772" cy="954107"/>
+          </a:xfrm>
+          <a:prstGeom prst="rect">
+            <a:avLst/>
+          </a:prstGeom>
+          <a:noFill/>
+        </p:spPr>
+        <p:txBody>
+          <a:bodyPr wrap="square" rtlCol="0">
+            <a:spAutoFit/>
+          </a:bodyPr>
+          <a:lstStyle/>
+          <a:p>
+            <a:pPr algn="ctr"/>
+            <a:r>
+              <a:rPr kumimoji="1" lang="en-US" altLang="zh-CN" sz="2800" dirty="0" err="1">
+                <a:latin typeface="+mj-lt"/>
+              </a:rPr>
+              <a:t>Zitao</a:t>
+            </a:r>
+            <a:endParaRPr kumimoji="1" lang="en-US" altLang="zh-CN" sz="2800" dirty="0">
+              <a:latin typeface="+mj-lt"/>
+            </a:endParaRPr>
+          </a:p>
+          <a:p>
+            <a:pPr algn="ctr"/>
+            <a:r>
+              <a:rPr kumimoji="1" lang="en-US" altLang="zh-CN" sz="2800" dirty="0">
+                <a:latin typeface="+mj-lt"/>
+              </a:rPr>
+              <a:t>Liu</a:t>
+            </a:r>
+            <a:endParaRPr kumimoji="1" lang="zh-CN" altLang="en-US" sz="2800" dirty="0">
+              <a:latin typeface="+mj-lt"/>
+            </a:endParaRPr>
+          </a:p>
+        </p:txBody>
+      </p:sp>
+      <p:sp>
+        <p:nvSpPr>
+          <p:cNvPr id="15" name="文本框 14">
+            <a:extLst>
+              <a:ext uri="{FF2B5EF4-FFF2-40B4-BE49-F238E27FC236}">
+                <a16:creationId xmlns:a16="http://schemas.microsoft.com/office/drawing/2014/main" id="{ADE6C7B8-09CD-4248-BFF2-1782D4F0637E}"/>
+              </a:ext>
+            </a:extLst>
+          </p:cNvPr>
+          <p:cNvSpPr txBox="1"/>
+          <p:nvPr/>
+        </p:nvSpPr>
+        <p:spPr>
+          <a:xfrm>
+            <a:off x="3126108" y="2621973"/>
+            <a:ext cx="1453185" cy="954107"/>
+          </a:xfrm>
+          <a:prstGeom prst="rect">
+            <a:avLst/>
+          </a:prstGeom>
+          <a:noFill/>
+        </p:spPr>
+        <p:txBody>
+          <a:bodyPr wrap="square" rtlCol="0">
+            <a:spAutoFit/>
+          </a:bodyPr>
+          <a:lstStyle/>
+          <a:p>
+            <a:pPr algn="ctr"/>
+            <a:r>
+              <a:rPr kumimoji="1" lang="en-US" altLang="zh-CN" sz="2800" dirty="0">
+                <a:latin typeface="+mj-lt"/>
+              </a:rPr>
+              <a:t>Richard</a:t>
+            </a:r>
+          </a:p>
+          <a:p>
+            <a:pPr algn="ctr"/>
+            <a:r>
+              <a:rPr kumimoji="1" lang="en-US" altLang="zh-CN" sz="2800" dirty="0">
+                <a:latin typeface="+mj-lt"/>
+              </a:rPr>
+              <a:t>Tong</a:t>
+            </a:r>
+            <a:endParaRPr kumimoji="1" lang="zh-CN" altLang="en-US" sz="2800" dirty="0">
+              <a:latin typeface="+mj-lt"/>
+            </a:endParaRPr>
+          </a:p>
+        </p:txBody>
+      </p:sp>
+      <p:sp>
+        <p:nvSpPr>
+          <p:cNvPr id="17" name="文本框 16">
+            <a:extLst>
+              <a:ext uri="{FF2B5EF4-FFF2-40B4-BE49-F238E27FC236}">
+                <a16:creationId xmlns:a16="http://schemas.microsoft.com/office/drawing/2014/main" id="{9E891CE8-5B95-A04B-B400-6A188D26BD2D}"/>
+              </a:ext>
+            </a:extLst>
+          </p:cNvPr>
+          <p:cNvSpPr txBox="1"/>
+          <p:nvPr/>
+        </p:nvSpPr>
+        <p:spPr>
+          <a:xfrm>
+            <a:off x="5624202" y="2621973"/>
+            <a:ext cx="1453184" cy="954107"/>
+          </a:xfrm>
+          <a:prstGeom prst="rect">
+            <a:avLst/>
+          </a:prstGeom>
+          <a:noFill/>
+        </p:spPr>
+        <p:txBody>
+          <a:bodyPr wrap="square" rtlCol="0">
+            <a:spAutoFit/>
+          </a:bodyPr>
+          <a:lstStyle/>
+          <a:p>
+            <a:pPr algn="ctr"/>
+            <a:r>
+              <a:rPr kumimoji="1" lang="en-US" altLang="zh-CN" sz="2800" dirty="0" err="1">
+                <a:latin typeface="+mj-lt"/>
+              </a:rPr>
+              <a:t>Jiliang</a:t>
+            </a:r>
+            <a:endParaRPr kumimoji="1" lang="en-US" altLang="zh-CN" sz="2800" dirty="0">
+              <a:latin typeface="+mj-lt"/>
+            </a:endParaRPr>
+          </a:p>
+          <a:p>
+            <a:pPr algn="ctr"/>
+            <a:r>
+              <a:rPr kumimoji="1" lang="en-US" altLang="zh-CN" sz="2800" dirty="0">
+                <a:latin typeface="+mj-lt"/>
+              </a:rPr>
+              <a:t>Tang</a:t>
+            </a:r>
+          </a:p>
+        </p:txBody>
+      </p:sp>
+      <p:sp>
+        <p:nvSpPr>
+          <p:cNvPr id="18" name="文本框 17">
+            <a:extLst>
+              <a:ext uri="{FF2B5EF4-FFF2-40B4-BE49-F238E27FC236}">
+                <a16:creationId xmlns:a16="http://schemas.microsoft.com/office/drawing/2014/main" id="{91B1C136-6F6D-3249-8311-CBA0596EECA9}"/>
+              </a:ext>
+            </a:extLst>
+          </p:cNvPr>
+          <p:cNvSpPr txBox="1"/>
+          <p:nvPr/>
+        </p:nvSpPr>
+        <p:spPr>
+          <a:xfrm>
+            <a:off x="7999494" y="2621972"/>
+            <a:ext cx="1706326" cy="954107"/>
+          </a:xfrm>
+          <a:prstGeom prst="rect">
+            <a:avLst/>
+          </a:prstGeom>
+          <a:noFill/>
+        </p:spPr>
+        <p:txBody>
+          <a:bodyPr wrap="square" rtlCol="0">
+            <a:spAutoFit/>
+          </a:bodyPr>
+          <a:lstStyle/>
+          <a:p>
+            <a:pPr algn="ctr"/>
+            <a:r>
+              <a:rPr kumimoji="1" lang="en-US" altLang="zh-CN" sz="2800" dirty="0" err="1">
+                <a:latin typeface="+mj-lt"/>
+              </a:rPr>
+              <a:t>Xiangen</a:t>
+            </a:r>
+            <a:endParaRPr kumimoji="1" lang="en-US" altLang="zh-CN" sz="2800" dirty="0">
+              <a:latin typeface="+mj-lt"/>
+            </a:endParaRPr>
+          </a:p>
+          <a:p>
+            <a:pPr algn="ctr"/>
+            <a:r>
+              <a:rPr kumimoji="1" lang="en-US" altLang="zh-CN" sz="2800" dirty="0">
+                <a:latin typeface="+mj-lt"/>
+              </a:rPr>
+              <a:t>Hu</a:t>
+            </a:r>
+            <a:endParaRPr kumimoji="1" lang="zh-CN" altLang="en-US" sz="2800" dirty="0">
+              <a:latin typeface="+mj-lt"/>
+            </a:endParaRPr>
+          </a:p>
+        </p:txBody>
+      </p:sp>
+      <p:sp>
+        <p:nvSpPr>
+          <p:cNvPr id="19" name="文本框 18">
+            <a:extLst>
+              <a:ext uri="{FF2B5EF4-FFF2-40B4-BE49-F238E27FC236}">
+                <a16:creationId xmlns:a16="http://schemas.microsoft.com/office/drawing/2014/main" id="{37302D52-BD15-724F-A0B1-3CAA102352D9}"/>
+              </a:ext>
+            </a:extLst>
+          </p:cNvPr>
+          <p:cNvSpPr txBox="1"/>
+          <p:nvPr/>
+        </p:nvSpPr>
+        <p:spPr>
+          <a:xfrm>
+            <a:off x="10626043" y="2621971"/>
+            <a:ext cx="1453183" cy="954107"/>
+          </a:xfrm>
+          <a:prstGeom prst="rect">
+            <a:avLst/>
+          </a:prstGeom>
+          <a:noFill/>
+        </p:spPr>
+        <p:txBody>
+          <a:bodyPr wrap="square" rtlCol="0">
+            <a:spAutoFit/>
+          </a:bodyPr>
+          <a:lstStyle/>
+          <a:p>
+            <a:pPr algn="ctr"/>
+            <a:r>
+              <a:rPr kumimoji="1" lang="en-US" altLang="zh-CN" sz="2800" dirty="0">
+                <a:latin typeface="+mj-lt"/>
+              </a:rPr>
+              <a:t>Hang</a:t>
+            </a:r>
+          </a:p>
+          <a:p>
+            <a:pPr algn="ctr"/>
+            <a:r>
+              <a:rPr kumimoji="1" lang="en-US" altLang="zh-CN" sz="2800" dirty="0">
+                <a:latin typeface="+mj-lt"/>
+              </a:rPr>
+              <a:t>Li</a:t>
+            </a:r>
+            <a:endParaRPr kumimoji="1" lang="zh-CN" altLang="en-US" sz="2800" dirty="0">
+              <a:latin typeface="+mj-lt"/>
+            </a:endParaRPr>
+          </a:p>
+        </p:txBody>
+      </p:sp>
+      <p:pic>
+        <p:nvPicPr>
+          <p:cNvPr id="16" name="图片 15">
+            <a:extLst>
+              <a:ext uri="{FF2B5EF4-FFF2-40B4-BE49-F238E27FC236}">
+                <a16:creationId xmlns:a16="http://schemas.microsoft.com/office/drawing/2014/main" id="{3F1F2D72-242C-8846-81DD-850F9414AE92}"/>
+              </a:ext>
+            </a:extLst>
+          </p:cNvPr>
+          <p:cNvPicPr>
+            <a:picLocks noChangeAspect="1"/>
+          </p:cNvPicPr>
+          <p:nvPr/>
+        </p:nvPicPr>
+        <p:blipFill rotWithShape="1">
+          <a:blip r:embed="rId3"/>
+          <a:srcRect/>
+          <a:stretch/>
+        </p:blipFill>
+        <p:spPr>
+          <a:xfrm>
+            <a:off x="10164635" y="35293"/>
+            <a:ext cx="2377572" cy="2370930"/>
+          </a:xfrm>
+          <a:prstGeom prst="ellipse">
+            <a:avLst/>
+          </a:prstGeom>
+        </p:spPr>
+      </p:pic>
+      <p:pic>
+        <p:nvPicPr>
+          <p:cNvPr id="20" name="图片 19">
+            <a:extLst>
+              <a:ext uri="{FF2B5EF4-FFF2-40B4-BE49-F238E27FC236}">
+                <a16:creationId xmlns:a16="http://schemas.microsoft.com/office/drawing/2014/main" id="{CE2DC4C0-2C91-5A4E-AF3B-672A2438C188}"/>
+              </a:ext>
+            </a:extLst>
+          </p:cNvPr>
+          <p:cNvPicPr>
+            <a:picLocks noChangeAspect="1"/>
+          </p:cNvPicPr>
+          <p:nvPr/>
+        </p:nvPicPr>
+        <p:blipFill>
+          <a:blip r:embed="rId4"/>
+          <a:stretch>
+            <a:fillRect/>
+          </a:stretch>
+        </p:blipFill>
+        <p:spPr>
+          <a:xfrm>
+            <a:off x="7664657" y="32758"/>
+            <a:ext cx="2376000" cy="2376000"/>
+          </a:xfrm>
+          <a:prstGeom prst="ellipse">
+            <a:avLst/>
+          </a:prstGeom>
+        </p:spPr>
+      </p:pic>
+      <p:pic>
+        <p:nvPicPr>
+          <p:cNvPr id="21" name="图片 20">
+            <a:extLst>
+              <a:ext uri="{FF2B5EF4-FFF2-40B4-BE49-F238E27FC236}">
+                <a16:creationId xmlns:a16="http://schemas.microsoft.com/office/drawing/2014/main" id="{88CCE240-FCB0-9140-8C88-A2AD5CDDBB14}"/>
+              </a:ext>
+            </a:extLst>
+          </p:cNvPr>
+          <p:cNvPicPr>
+            <a:picLocks noChangeAspect="1"/>
+          </p:cNvPicPr>
+          <p:nvPr/>
+        </p:nvPicPr>
+        <p:blipFill rotWithShape="1">
+          <a:blip r:embed="rId5"/>
+          <a:srcRect/>
+          <a:stretch/>
+        </p:blipFill>
+        <p:spPr>
+          <a:xfrm>
+            <a:off x="2678025" y="32758"/>
+            <a:ext cx="2341812" cy="2376000"/>
+          </a:xfrm>
+          <a:prstGeom prst="ellipse">
+            <a:avLst/>
+          </a:prstGeom>
+        </p:spPr>
+      </p:pic>
+      <p:pic>
+        <p:nvPicPr>
+          <p:cNvPr id="23" name="图片 22">
+            <a:extLst>
+              <a:ext uri="{FF2B5EF4-FFF2-40B4-BE49-F238E27FC236}">
+                <a16:creationId xmlns:a16="http://schemas.microsoft.com/office/drawing/2014/main" id="{9ED207F5-99DD-B141-9EC1-0F053AD6433E}"/>
+              </a:ext>
+            </a:extLst>
+          </p:cNvPr>
+          <p:cNvPicPr>
+            <a:picLocks noChangeAspect="1"/>
+          </p:cNvPicPr>
+          <p:nvPr/>
+        </p:nvPicPr>
+        <p:blipFill rotWithShape="1">
+          <a:blip r:embed="rId6"/>
+          <a:srcRect l="831" t="5424" r="-831" b="28140"/>
+          <a:stretch/>
+        </p:blipFill>
+        <p:spPr>
+          <a:xfrm>
+            <a:off x="5157139" y="32758"/>
+            <a:ext cx="2376000" cy="2376000"/>
+          </a:xfrm>
+          <a:prstGeom prst="ellipse">
+            <a:avLst/>
+          </a:prstGeom>
+        </p:spPr>
+      </p:pic>
+    </p:spTree>
+    <p:extLst>
+      <p:ext uri="{BB962C8B-B14F-4D97-AF65-F5344CB8AC3E}">
+        <p14:creationId xmlns:p14="http://schemas.microsoft.com/office/powerpoint/2010/main" val="2260862213"/>
+      </p:ext>
+    </p:extLst>
+  </p:cSld>
+  <p:clrMapOvr>
+    <a:masterClrMapping/>
+  </p:clrMapOvr>
+</p:sld>
+</file>
+
 <file path=ppt/theme/theme1.xml><?xml version="1.0" encoding="utf-8"?>
 <a:theme xmlns:a="http://schemas.openxmlformats.org/drawingml/2006/main" name="Office 主题​​">
   <a:themeElements>

</xml_diff>